<commit_message>
Vital and health statistics
</commit_message>
<xml_diff>
--- a/Crystal/Energy_resolution/moses_IPNsemin_21102011.pptx
+++ b/Crystal/Energy_resolution/moses_IPNsemin_21102011.pptx
@@ -36106,7 +36106,7 @@
           <a:graphicData uri="http://schemas.openxmlformats.org/presentationml/2006/ole">
             <mc:AlternateContent xmlns:mc="http://schemas.openxmlformats.org/markup-compatibility/2006">
               <mc:Choice xmlns:v="urn:schemas-microsoft-com:vml" Requires="v">
-                <p:oleObj spid="_x0000_s85035" name="Equation" r:id="rId4" imgW="4711700" imgH="736600" progId="Equation.3">
+                <p:oleObj spid="_x0000_s85036" name="Equation" r:id="rId4" imgW="4711700" imgH="736600" progId="Equation.3">
                   <p:embed/>
                 </p:oleObj>
               </mc:Choice>
@@ -37208,7 +37208,7 @@
           <a:graphicData uri="http://schemas.openxmlformats.org/presentationml/2006/ole">
             <mc:AlternateContent xmlns:mc="http://schemas.openxmlformats.org/markup-compatibility/2006">
               <mc:Choice xmlns:v="urn:schemas-microsoft-com:vml" Requires="v">
-                <p:oleObj spid="_x0000_s89131" name="Equation" r:id="rId4" imgW="6134100" imgH="1092200" progId="Equation.3">
+                <p:oleObj spid="_x0000_s89132" name="Equation" r:id="rId4" imgW="6134100" imgH="1092200" progId="Equation.3">
                   <p:embed/>
                 </p:oleObj>
               </mc:Choice>
@@ -37567,11 +37567,20 @@
               <a:defRPr/>
             </a:pPr>
             <a:r>
-              <a:rPr lang="en-US" sz="2800" b="1">
+              <a:rPr lang="en-US" sz="2800" b="1" dirty="0">
                 <a:ea typeface="ＭＳ Ｐゴシック" charset="-128"/>
               </a:rPr>
-              <a:t>Ratio of Diameters ∝ Ratio of Mobilities</a:t>
-            </a:r>
+              <a:t>Ratio of Diameters ∝ Ratio of </a:t>
+            </a:r>
+            <a:r>
+              <a:rPr lang="en-US" sz="2800" b="1" dirty="0" err="1">
+                <a:ea typeface="ＭＳ Ｐゴシック" charset="-128"/>
+              </a:rPr>
+              <a:t>Mobilities</a:t>
+            </a:r>
+            <a:endParaRPr lang="en-US" sz="2800" b="1" dirty="0">
+              <a:ea typeface="ＭＳ Ｐゴシック" charset="-128"/>
+            </a:endParaRPr>
           </a:p>
           <a:p>
             <a:pPr marL="228600" indent="-228600" algn="ctr" defTabSz="858838" eaLnBrk="0" hangingPunct="0">
@@ -37583,20 +37592,20 @@
               <a:defRPr/>
             </a:pPr>
             <a:r>
-              <a:rPr lang="en-US" sz="2800" b="1">
+              <a:rPr lang="en-US" sz="2800" b="1" dirty="0">
                 <a:ea typeface="ＭＳ Ｐゴシック" charset="-128"/>
               </a:rPr>
               <a:t>Similar Diameters </a:t>
             </a:r>
             <a:r>
-              <a:rPr lang="en-US" sz="2800" b="1">
+              <a:rPr lang="en-US" sz="2800" b="1" dirty="0">
                 <a:latin typeface="Wingdings" charset="2"/>
                 <a:ea typeface="ＭＳ Ｐゴシック" charset="-128"/>
               </a:rPr>
               <a:t></a:t>
             </a:r>
             <a:r>
-              <a:rPr lang="en-US" sz="2800" b="1">
+              <a:rPr lang="en-US" sz="2800" b="1" dirty="0">
                 <a:ea typeface="ＭＳ Ｐゴシック" charset="-128"/>
               </a:rPr>
               <a:t> High Recombination Probability</a:t>
@@ -37612,56 +37621,62 @@
               <a:defRPr/>
             </a:pPr>
             <a:r>
-              <a:rPr lang="en-US" sz="2800" b="1">
+              <a:rPr lang="en-US" sz="2800" b="1" dirty="0" err="1">
                 <a:ea typeface="ＭＳ Ｐゴシック" charset="-128"/>
               </a:rPr>
               <a:t>μ</a:t>
             </a:r>
             <a:r>
-              <a:rPr lang="en-US" sz="2800" b="1" baseline="-25000">
+              <a:rPr lang="en-US" sz="2800" b="1" baseline="-25000" dirty="0" err="1">
                 <a:ea typeface="ＭＳ Ｐゴシック" charset="-128"/>
               </a:rPr>
               <a:t>hole</a:t>
             </a:r>
             <a:r>
-              <a:rPr lang="en-US" sz="2800" b="1">
+              <a:rPr lang="en-US" sz="2800" b="1" dirty="0">
                 <a:ea typeface="ＭＳ Ｐゴシック" charset="-128"/>
               </a:rPr>
-              <a:t> ≈ μ</a:t>
-            </a:r>
-            <a:r>
-              <a:rPr lang="en-US" sz="2800" b="1" baseline="-25000">
+              <a:t> ≈ </a:t>
+            </a:r>
+            <a:r>
+              <a:rPr lang="en-US" sz="2800" b="1" dirty="0" err="1">
+                <a:ea typeface="ＭＳ Ｐゴシック" charset="-128"/>
+              </a:rPr>
+              <a:t>μ</a:t>
+            </a:r>
+            <a:r>
+              <a:rPr lang="en-US" sz="2800" b="1" baseline="-25000" dirty="0" err="1">
                 <a:ea typeface="ＭＳ Ｐゴシック" charset="-128"/>
               </a:rPr>
               <a:t>electron</a:t>
             </a:r>
             <a:r>
-              <a:rPr lang="en-US" sz="2800" b="1">
+              <a:rPr lang="en-US" sz="2800" b="1" dirty="0">
                 <a:ea typeface="ＭＳ Ｐゴシック" charset="-128"/>
               </a:rPr>
               <a:t> </a:t>
             </a:r>
             <a:r>
-              <a:rPr lang="en-US" sz="2800" b="1">
+              <a:rPr lang="en-US" sz="2800" b="1" dirty="0">
                 <a:latin typeface="Wingdings" charset="2"/>
                 <a:ea typeface="ＭＳ Ｐゴシック" charset="-128"/>
               </a:rPr>
               <a:t></a:t>
             </a:r>
             <a:r>
-              <a:rPr lang="en-US" sz="2800" b="1">
+              <a:rPr lang="en-US" sz="2800" b="1" dirty="0">
                 <a:ea typeface="ＭＳ Ｐゴシック" charset="-128"/>
               </a:rPr>
               <a:t> Proportional Scintillator </a:t>
             </a:r>
             <a:r>
-              <a:rPr lang="en-US" sz="2800" b="1">
+              <a:rPr lang="en-US" sz="2800" b="1" dirty="0">
                 <a:latin typeface="Wingdings" charset="2"/>
                 <a:ea typeface="ＭＳ Ｐゴシック" charset="-128"/>
               </a:rPr>
               <a:t> </a:t>
             </a:r>
-            <a:endParaRPr lang="en-US" sz="2800" b="1">
+            <a:endParaRPr lang="en-US" sz="2800" b="1" dirty="0">
               <a:ea typeface="ＭＳ Ｐゴシック" charset="-128"/>
             </a:endParaRPr>
           </a:p>

</xml_diff>